<commit_message>
Fixed a bug in feature selection
</commit_message>
<xml_diff>
--- a/docs/slides.pptx
+++ b/docs/slides.pptx
@@ -216,7 +216,7 @@
           <a:p>
             <a:fld id="{C84EE9BF-D3C9-4899-B94A-6B64807A210A}" type="datetimeFigureOut">
               <a:rPr lang="en-US" smtClean="0"/>
-              <a:t>11/16/2022</a:t>
+              <a:t>11/17/2022</a:t>
             </a:fld>
             <a:endParaRPr lang="en-US"/>
           </a:p>
@@ -1031,7 +1031,7 @@
           <a:p>
             <a:fld id="{D4C6191E-1FBE-4E26-BB8D-9FABCFC2563B}" type="datetime1">
               <a:rPr lang="en-US" smtClean="0"/>
-              <a:t>11/16/2022</a:t>
+              <a:t>11/17/2022</a:t>
             </a:fld>
             <a:endParaRPr lang="en-US"/>
           </a:p>
@@ -1229,7 +1229,7 @@
           <a:p>
             <a:fld id="{A95FA4B2-D948-4CE2-860F-A5F54E19DB9B}" type="datetime1">
               <a:rPr lang="en-US" smtClean="0"/>
-              <a:t>11/16/2022</a:t>
+              <a:t>11/17/2022</a:t>
             </a:fld>
             <a:endParaRPr lang="en-US"/>
           </a:p>
@@ -1437,7 +1437,7 @@
           <a:p>
             <a:fld id="{BD4CD156-E460-4667-A323-B35C1C6FD505}" type="datetime1">
               <a:rPr lang="en-US" smtClean="0"/>
-              <a:t>11/16/2022</a:t>
+              <a:t>11/17/2022</a:t>
             </a:fld>
             <a:endParaRPr lang="en-US"/>
           </a:p>
@@ -1657,7 +1657,7 @@
           <a:p>
             <a:fld id="{A4DEE1E4-9617-4958-A731-23EC075B03BA}" type="datetime1">
               <a:rPr lang="en-US" smtClean="0"/>
-              <a:t>11/16/2022</a:t>
+              <a:t>11/17/2022</a:t>
             </a:fld>
             <a:endParaRPr lang="en-US"/>
           </a:p>
@@ -1855,7 +1855,7 @@
           <a:p>
             <a:fld id="{C3A845FD-6125-4953-87DC-D0302DD10C43}" type="datetime1">
               <a:rPr lang="en-US" smtClean="0"/>
-              <a:t>11/16/2022</a:t>
+              <a:t>11/17/2022</a:t>
             </a:fld>
             <a:endParaRPr lang="en-US"/>
           </a:p>
@@ -2130,7 +2130,7 @@
           <a:p>
             <a:fld id="{F67DCDCA-0B3A-4300-B07D-0B8351C3F3C5}" type="datetime1">
               <a:rPr lang="en-US" smtClean="0"/>
-              <a:t>11/16/2022</a:t>
+              <a:t>11/17/2022</a:t>
             </a:fld>
             <a:endParaRPr lang="en-US"/>
           </a:p>
@@ -2395,7 +2395,7 @@
           <a:p>
             <a:fld id="{6DD62530-3782-4543-B601-FA5955EBCB11}" type="datetime1">
               <a:rPr lang="en-US" smtClean="0"/>
-              <a:t>11/16/2022</a:t>
+              <a:t>11/17/2022</a:t>
             </a:fld>
             <a:endParaRPr lang="en-US"/>
           </a:p>
@@ -2807,7 +2807,7 @@
           <a:p>
             <a:fld id="{C2B34CBF-ADFF-42BE-AA82-31836E1EDE78}" type="datetime1">
               <a:rPr lang="en-US" smtClean="0"/>
-              <a:t>11/16/2022</a:t>
+              <a:t>11/17/2022</a:t>
             </a:fld>
             <a:endParaRPr lang="en-US"/>
           </a:p>
@@ -2948,7 +2948,7 @@
           <a:p>
             <a:fld id="{165FAC16-4B2F-497B-8506-934158880C57}" type="datetime1">
               <a:rPr lang="en-US" smtClean="0"/>
-              <a:t>11/16/2022</a:t>
+              <a:t>11/17/2022</a:t>
             </a:fld>
             <a:endParaRPr lang="en-US"/>
           </a:p>
@@ -3061,7 +3061,7 @@
           <a:p>
             <a:fld id="{7A2B1533-9BB0-4001-8BF9-8D175630F960}" type="datetime1">
               <a:rPr lang="en-US" smtClean="0"/>
-              <a:t>11/16/2022</a:t>
+              <a:t>11/17/2022</a:t>
             </a:fld>
             <a:endParaRPr lang="en-US"/>
           </a:p>
@@ -3372,7 +3372,7 @@
           <a:p>
             <a:fld id="{EEBA9D00-0C72-46F0-B5AA-95AA925C80D4}" type="datetime1">
               <a:rPr lang="en-US" smtClean="0"/>
-              <a:t>11/16/2022</a:t>
+              <a:t>11/17/2022</a:t>
             </a:fld>
             <a:endParaRPr lang="en-US"/>
           </a:p>
@@ -3613,7 +3613,7 @@
           <a:p>
             <a:fld id="{E66C3273-B17F-42B1-8DD8-2892CCCC7E02}" type="datetime1">
               <a:rPr lang="en-US" smtClean="0"/>
-              <a:t>11/16/2022</a:t>
+              <a:t>11/17/2022</a:t>
             </a:fld>
             <a:endParaRPr lang="en-US"/>
           </a:p>
@@ -5137,7 +5137,7 @@
               <p:nvPr>
                 <p:extLst>
                   <p:ext uri="{D42A27DB-BD31-4B8C-83A1-F6EECF244321}">
-                    <p14:modId xmlns:p14="http://schemas.microsoft.com/office/powerpoint/2010/main" val="643496414"/>
+                    <p14:modId xmlns:p14="http://schemas.microsoft.com/office/powerpoint/2010/main" val="3652818040"/>
                   </p:ext>
                 </p:extLst>
               </p:nvPr>
@@ -5156,14 +5156,14 @@
                     <a:tableStyleId>{5C22544A-7EE6-4342-B048-85BDC9FD1C3A}</a:tableStyleId>
                   </a:tblPr>
                   <a:tblGrid>
-                    <a:gridCol w="2452551">
+                    <a:gridCol w="2524097">
                       <a:extLst>
                         <a:ext uri="{9D8B030D-6E8A-4147-A177-3AD203B41FA5}">
                           <a16:colId xmlns:a16="http://schemas.microsoft.com/office/drawing/2014/main" val="2088205750"/>
                         </a:ext>
                       </a:extLst>
                     </a:gridCol>
-                    <a:gridCol w="5276088">
+                    <a:gridCol w="5204542">
                       <a:extLst>
                         <a:ext uri="{9D8B030D-6E8A-4147-A177-3AD203B41FA5}">
                           <a16:colId xmlns:a16="http://schemas.microsoft.com/office/drawing/2014/main" val="529107007"/>
@@ -5437,7 +5437,7 @@
                               <a:latin typeface="Times New Roman" panose="02020603050405020304" pitchFamily="18" charset="0"/>
                               <a:cs typeface="Times New Roman" panose="02020603050405020304" pitchFamily="18" charset="0"/>
                             </a:rPr>
-                            <a:t>Linear Support Vector with Balanced Class</a:t>
+                            <a:t>Linear Support Vector with Balanced Classes</a:t>
                           </a:r>
                         </a:p>
                       </a:txBody>
@@ -5884,7 +5884,7 @@
               <p:nvPr>
                 <p:extLst>
                   <p:ext uri="{D42A27DB-BD31-4B8C-83A1-F6EECF244321}">
-                    <p14:modId xmlns:p14="http://schemas.microsoft.com/office/powerpoint/2010/main" val="643496414"/>
+                    <p14:modId xmlns:p14="http://schemas.microsoft.com/office/powerpoint/2010/main" val="3652818040"/>
                   </p:ext>
                 </p:extLst>
               </p:nvPr>
@@ -5903,14 +5903,14 @@
                     <a:tableStyleId>{5C22544A-7EE6-4342-B048-85BDC9FD1C3A}</a:tableStyleId>
                   </a:tblPr>
                   <a:tblGrid>
-                    <a:gridCol w="2452551">
+                    <a:gridCol w="2524097">
                       <a:extLst>
                         <a:ext uri="{9D8B030D-6E8A-4147-A177-3AD203B41FA5}">
                           <a16:colId xmlns:a16="http://schemas.microsoft.com/office/drawing/2014/main" val="2088205750"/>
                         </a:ext>
                       </a:extLst>
                     </a:gridCol>
-                    <a:gridCol w="5276088">
+                    <a:gridCol w="5204542">
                       <a:extLst>
                         <a:ext uri="{9D8B030D-6E8A-4147-A177-3AD203B41FA5}">
                           <a16:colId xmlns:a16="http://schemas.microsoft.com/office/drawing/2014/main" val="529107007"/>
@@ -6072,7 +6072,7 @@
                         <a:blipFill>
                           <a:blip r:embed="rId3"/>
                           <a:stretch>
-                            <a:fillRect l="-46536" t="-107692" r="-62009" b="-306154"/>
+                            <a:fillRect l="-48595" t="-107692" r="-62881" b="-306154"/>
                           </a:stretch>
                         </a:blipFill>
                       </a:tcPr>
@@ -6146,7 +6146,7 @@
                               <a:latin typeface="Times New Roman" panose="02020603050405020304" pitchFamily="18" charset="0"/>
                               <a:cs typeface="Times New Roman" panose="02020603050405020304" pitchFamily="18" charset="0"/>
                             </a:rPr>
-                            <a:t>Linear Support Vector with Balanced Class</a:t>
+                            <a:t>Linear Support Vector with Balanced Classes</a:t>
                           </a:r>
                         </a:p>
                       </a:txBody>
@@ -6168,7 +6168,7 @@
                         <a:blipFill>
                           <a:blip r:embed="rId3"/>
                           <a:stretch>
-                            <a:fillRect l="-46536" t="-116379" r="-62009" b="-71552"/>
+                            <a:fillRect l="-48595" t="-116379" r="-62881" b="-71552"/>
                           </a:stretch>
                         </a:blipFill>
                       </a:tcPr>
@@ -6265,7 +6265,7 @@
                         <a:blipFill>
                           <a:blip r:embed="rId3"/>
                           <a:stretch>
-                            <a:fillRect l="-46536" t="-386154" r="-62009" b="-27692"/>
+                            <a:fillRect l="-48595" t="-386154" r="-62881" b="-27692"/>
                           </a:stretch>
                         </a:blipFill>
                       </a:tcPr>
@@ -6557,7 +6557,7 @@
               <p:nvPr>
                 <p:extLst>
                   <p:ext uri="{D42A27DB-BD31-4B8C-83A1-F6EECF244321}">
-                    <p14:modId xmlns:p14="http://schemas.microsoft.com/office/powerpoint/2010/main" val="3772732658"/>
+                    <p14:modId xmlns:p14="http://schemas.microsoft.com/office/powerpoint/2010/main" val="853691378"/>
                   </p:ext>
                 </p:extLst>
               </p:nvPr>
@@ -6576,14 +6576,14 @@
                     <a:tableStyleId>{5C22544A-7EE6-4342-B048-85BDC9FD1C3A}</a:tableStyleId>
                   </a:tblPr>
                   <a:tblGrid>
-                    <a:gridCol w="2452551">
+                    <a:gridCol w="2524097">
                       <a:extLst>
                         <a:ext uri="{9D8B030D-6E8A-4147-A177-3AD203B41FA5}">
                           <a16:colId xmlns:a16="http://schemas.microsoft.com/office/drawing/2014/main" val="2088205750"/>
                         </a:ext>
                       </a:extLst>
                     </a:gridCol>
-                    <a:gridCol w="5279651">
+                    <a:gridCol w="5208105">
                       <a:extLst>
                         <a:ext uri="{9D8B030D-6E8A-4147-A177-3AD203B41FA5}">
                           <a16:colId xmlns:a16="http://schemas.microsoft.com/office/drawing/2014/main" val="529107007"/>
@@ -6857,7 +6857,7 @@
                               <a:latin typeface="Times New Roman" panose="02020603050405020304" pitchFamily="18" charset="0"/>
                               <a:cs typeface="Times New Roman" panose="02020603050405020304" pitchFamily="18" charset="0"/>
                             </a:rPr>
-                            <a:t>Linear Support Vector with Balanced Class</a:t>
+                            <a:t>Linear Support Vector with Balanced Classes</a:t>
                           </a:r>
                         </a:p>
                       </a:txBody>
@@ -7304,7 +7304,7 @@
               <p:nvPr>
                 <p:extLst>
                   <p:ext uri="{D42A27DB-BD31-4B8C-83A1-F6EECF244321}">
-                    <p14:modId xmlns:p14="http://schemas.microsoft.com/office/powerpoint/2010/main" val="3772732658"/>
+                    <p14:modId xmlns:p14="http://schemas.microsoft.com/office/powerpoint/2010/main" val="853691378"/>
                   </p:ext>
                 </p:extLst>
               </p:nvPr>
@@ -7323,14 +7323,14 @@
                     <a:tableStyleId>{5C22544A-7EE6-4342-B048-85BDC9FD1C3A}</a:tableStyleId>
                   </a:tblPr>
                   <a:tblGrid>
-                    <a:gridCol w="2452551">
+                    <a:gridCol w="2524097">
                       <a:extLst>
                         <a:ext uri="{9D8B030D-6E8A-4147-A177-3AD203B41FA5}">
                           <a16:colId xmlns:a16="http://schemas.microsoft.com/office/drawing/2014/main" val="2088205750"/>
                         </a:ext>
                       </a:extLst>
                     </a:gridCol>
-                    <a:gridCol w="5279651">
+                    <a:gridCol w="5208105">
                       <a:extLst>
                         <a:ext uri="{9D8B030D-6E8A-4147-A177-3AD203B41FA5}">
                           <a16:colId xmlns:a16="http://schemas.microsoft.com/office/drawing/2014/main" val="529107007"/>
@@ -7492,7 +7492,7 @@
                         <a:blipFill>
                           <a:blip r:embed="rId5"/>
                           <a:stretch>
-                            <a:fillRect l="-46651" t="-107692" r="-62009" b="-306154"/>
+                            <a:fillRect l="-48538" t="-107692" r="-62807" b="-306154"/>
                           </a:stretch>
                         </a:blipFill>
                       </a:tcPr>
@@ -7566,7 +7566,7 @@
                               <a:latin typeface="Times New Roman" panose="02020603050405020304" pitchFamily="18" charset="0"/>
                               <a:cs typeface="Times New Roman" panose="02020603050405020304" pitchFamily="18" charset="0"/>
                             </a:rPr>
-                            <a:t>Linear Support Vector with Balanced Class</a:t>
+                            <a:t>Linear Support Vector with Balanced Classes</a:t>
                           </a:r>
                         </a:p>
                       </a:txBody>
@@ -7588,7 +7588,7 @@
                         <a:blipFill>
                           <a:blip r:embed="rId5"/>
                           <a:stretch>
-                            <a:fillRect l="-46651" t="-116379" r="-62009" b="-71552"/>
+                            <a:fillRect l="-48538" t="-116379" r="-62807" b="-71552"/>
                           </a:stretch>
                         </a:blipFill>
                       </a:tcPr>
@@ -7685,7 +7685,7 @@
                         <a:blipFill>
                           <a:blip r:embed="rId5"/>
                           <a:stretch>
-                            <a:fillRect l="-46651" t="-386154" r="-62009" b="-27692"/>
+                            <a:fillRect l="-48538" t="-386154" r="-62807" b="-27692"/>
                           </a:stretch>
                         </a:blipFill>
                       </a:tcPr>
@@ -8669,8 +8669,8 @@
           </a:p>
         </p:txBody>
       </p:sp>
-      <mc:AlternateContent xmlns:mc="http://schemas.openxmlformats.org/markup-compatibility/2006">
-        <mc:Choice xmlns:a14="http://schemas.microsoft.com/office/drawing/2010/main" Requires="a14">
+      <mc:AlternateContent xmlns:mc="http://schemas.openxmlformats.org/markup-compatibility/2006" xmlns:a14="http://schemas.microsoft.com/office/drawing/2010/main">
+        <mc:Choice Requires="a14">
           <p:graphicFrame>
             <p:nvGraphicFramePr>
               <p:cNvPr id="2" name="Table 2">
@@ -8686,7 +8686,7 @@
               <p:nvPr>
                 <p:extLst>
                   <p:ext uri="{D42A27DB-BD31-4B8C-83A1-F6EECF244321}">
-                    <p14:modId xmlns:p14="http://schemas.microsoft.com/office/powerpoint/2010/main" val="1086680502"/>
+                    <p14:modId xmlns:p14="http://schemas.microsoft.com/office/powerpoint/2010/main" val="47094092"/>
                   </p:ext>
                 </p:extLst>
               </p:nvPr>
@@ -9915,7 +9915,7 @@
             </a:graphic>
           </p:graphicFrame>
         </mc:Choice>
-        <mc:Fallback>
+        <mc:Fallback xmlns="">
           <p:graphicFrame>
             <p:nvGraphicFramePr>
               <p:cNvPr id="2" name="Table 2">
@@ -9931,7 +9931,7 @@
               <p:nvPr>
                 <p:extLst>
                   <p:ext uri="{D42A27DB-BD31-4B8C-83A1-F6EECF244321}">
-                    <p14:modId xmlns:p14="http://schemas.microsoft.com/office/powerpoint/2010/main" val="1086680502"/>
+                    <p14:modId xmlns:p14="http://schemas.microsoft.com/office/powerpoint/2010/main" val="47094092"/>
                   </p:ext>
                 </p:extLst>
               </p:nvPr>
@@ -11101,8 +11101,8 @@
           <a:chExt cx="0" cy="0"/>
         </a:xfrm>
       </p:grpSpPr>
-      <mc:AlternateContent xmlns:mc="http://schemas.openxmlformats.org/markup-compatibility/2006">
-        <mc:Choice xmlns:a14="http://schemas.microsoft.com/office/drawing/2010/main" Requires="a14">
+      <mc:AlternateContent xmlns:mc="http://schemas.openxmlformats.org/markup-compatibility/2006" xmlns:a14="http://schemas.microsoft.com/office/drawing/2010/main">
+        <mc:Choice Requires="a14">
           <p:sp>
             <p:nvSpPr>
               <p:cNvPr id="8" name="TextBox 7">
@@ -11294,7 +11294,7 @@
             </p:txBody>
           </p:sp>
         </mc:Choice>
-        <mc:Fallback>
+        <mc:Fallback xmlns="">
           <p:sp>
             <p:nvSpPr>
               <p:cNvPr id="8" name="TextBox 7">
@@ -14466,8 +14466,8 @@
           <a:chExt cx="0" cy="0"/>
         </a:xfrm>
       </p:grpSpPr>
-      <mc:AlternateContent xmlns:mc="http://schemas.openxmlformats.org/markup-compatibility/2006">
-        <mc:Choice xmlns:a14="http://schemas.microsoft.com/office/drawing/2010/main" Requires="a14">
+      <mc:AlternateContent xmlns:mc="http://schemas.openxmlformats.org/markup-compatibility/2006" xmlns:a14="http://schemas.microsoft.com/office/drawing/2010/main">
+        <mc:Choice Requires="a14">
           <p:sp>
             <p:nvSpPr>
               <p:cNvPr id="8" name="TextBox 7">
@@ -14683,7 +14683,7 @@
             </p:txBody>
           </p:sp>
         </mc:Choice>
-        <mc:Fallback>
+        <mc:Fallback xmlns="">
           <p:sp>
             <p:nvSpPr>
               <p:cNvPr id="8" name="TextBox 7">
@@ -19202,6 +19202,16 @@
         </p:nvPicPr>
         <p:blipFill>
           <a:blip r:embed="rId2">
+            <a:clrChange>
+              <a:clrFrom>
+                <a:srgbClr val="FFFFFF"/>
+              </a:clrFrom>
+              <a:clrTo>
+                <a:srgbClr val="FFFFFF">
+                  <a:alpha val="0"/>
+                </a:srgbClr>
+              </a:clrTo>
+            </a:clrChange>
             <a:extLst>
               <a:ext uri="{28A0092B-C50C-407E-A947-70E740481C1C}">
                 <a14:useLocalDpi xmlns:a14="http://schemas.microsoft.com/office/drawing/2010/main" val="0"/>
@@ -19213,8 +19223,8 @@
         </p:blipFill>
         <p:spPr>
           <a:xfrm>
-            <a:off x="552883" y="1790238"/>
-            <a:ext cx="11086234" cy="4157337"/>
+            <a:off x="552884" y="1790238"/>
+            <a:ext cx="11086232" cy="4157337"/>
           </a:xfrm>
           <a:prstGeom prst="rect">
             <a:avLst/>
@@ -20298,20 +20308,29 @@
         </p:nvPicPr>
         <p:blipFill>
           <a:blip r:embed="rId3">
+            <a:clrChange>
+              <a:clrFrom>
+                <a:srgbClr val="FFFFFF"/>
+              </a:clrFrom>
+              <a:clrTo>
+                <a:srgbClr val="FFFFFF">
+                  <a:alpha val="0"/>
+                </a:srgbClr>
+              </a:clrTo>
+            </a:clrChange>
             <a:extLst>
               <a:ext uri="{28A0092B-C50C-407E-A947-70E740481C1C}">
                 <a14:useLocalDpi xmlns:a14="http://schemas.microsoft.com/office/drawing/2010/main" val="0"/>
               </a:ext>
             </a:extLst>
           </a:blip>
-          <a:stretch>
-            <a:fillRect/>
-          </a:stretch>
+          <a:srcRect/>
+          <a:stretch/>
         </p:blipFill>
         <p:spPr>
           <a:xfrm>
             <a:off x="6549224" y="1170213"/>
-            <a:ext cx="5202803" cy="3902102"/>
+            <a:ext cx="5202802" cy="3902102"/>
           </a:xfrm>
           <a:prstGeom prst="rect">
             <a:avLst/>

</xml_diff>